<commit_message>
added balsamiq mockups and ER graph/code to ppt
</commit_message>
<xml_diff>
--- a/Presentation.pptx
+++ b/Presentation.pptx
@@ -9,9 +9,12 @@
     <p:sldId id="266" r:id="rId3"/>
     <p:sldId id="257" r:id="rId4"/>
     <p:sldId id="258" r:id="rId5"/>
-    <p:sldId id="260" r:id="rId6"/>
-    <p:sldId id="261" r:id="rId7"/>
-    <p:sldId id="267" r:id="rId8"/>
+    <p:sldId id="268" r:id="rId6"/>
+    <p:sldId id="269" r:id="rId7"/>
+    <p:sldId id="260" r:id="rId8"/>
+    <p:sldId id="261" r:id="rId9"/>
+    <p:sldId id="270" r:id="rId10"/>
+    <p:sldId id="267" r:id="rId11"/>
   </p:sldIdLst>
   <p:sldSz cx="12192000" cy="6858000"/>
   <p:notesSz cx="6858000" cy="9144000"/>
@@ -110,6 +113,11 @@
       </a:defRPr>
     </a:lvl9pPr>
   </p:defaultTextStyle>
+  <p:extLst>
+    <p:ext uri="{EFAFB233-063F-42B5-8137-9DF3F51BA10A}">
+      <p15:sldGuideLst xmlns:p15="http://schemas.microsoft.com/office/powerpoint/2012/main"/>
+    </p:ext>
+  </p:extLst>
 </p:presentation>
 </file>
 
@@ -3646,6 +3654,81 @@
 </p:sld>
 </file>
 
+<file path=ppt/slides/slide10.xml><?xml version="1.0" encoding="utf-8"?>
+<p:sld xmlns:a="http://schemas.openxmlformats.org/drawingml/2006/main" xmlns:r="http://schemas.openxmlformats.org/officeDocument/2006/relationships" xmlns:p="http://schemas.openxmlformats.org/presentationml/2006/main">
+  <p:cSld>
+    <p:spTree>
+      <p:nvGrpSpPr>
+        <p:cNvPr id="1" name=""/>
+        <p:cNvGrpSpPr/>
+        <p:nvPr/>
+      </p:nvGrpSpPr>
+      <p:grpSpPr>
+        <a:xfrm>
+          <a:off x="0" y="0"/>
+          <a:ext cx="0" cy="0"/>
+          <a:chOff x="0" y="0"/>
+          <a:chExt cx="0" cy="0"/>
+        </a:xfrm>
+      </p:grpSpPr>
+      <p:sp>
+        <p:nvSpPr>
+          <p:cNvPr id="2" name="Title 1"/>
+          <p:cNvSpPr>
+            <a:spLocks noGrp="1"/>
+          </p:cNvSpPr>
+          <p:nvPr>
+            <p:ph type="title"/>
+          </p:nvPr>
+        </p:nvSpPr>
+        <p:spPr/>
+        <p:txBody>
+          <a:bodyPr>
+            <a:normAutofit/>
+          </a:bodyPr>
+          <a:lstStyle/>
+          <a:p>
+            <a:pPr algn="ctr"/>
+            <a:r>
+              <a:rPr lang="en-US" sz="4800" dirty="0" smtClean="0"/>
+              <a:t>Context</a:t>
+            </a:r>
+            <a:endParaRPr lang="en-US" sz="4800" dirty="0"/>
+          </a:p>
+        </p:txBody>
+      </p:sp>
+      <p:sp>
+        <p:nvSpPr>
+          <p:cNvPr id="3" name="Content Placeholder 2"/>
+          <p:cNvSpPr>
+            <a:spLocks noGrp="1"/>
+          </p:cNvSpPr>
+          <p:nvPr>
+            <p:ph idx="1"/>
+          </p:nvPr>
+        </p:nvSpPr>
+        <p:spPr/>
+        <p:txBody>
+          <a:bodyPr/>
+          <a:lstStyle/>
+          <a:p>
+            <a:endParaRPr lang="en-US"/>
+          </a:p>
+        </p:txBody>
+      </p:sp>
+    </p:spTree>
+    <p:extLst>
+      <p:ext uri="{BB962C8B-B14F-4D97-AF65-F5344CB8AC3E}">
+        <p14:creationId xmlns:p14="http://schemas.microsoft.com/office/powerpoint/2010/main" val="1042415097"/>
+      </p:ext>
+    </p:extLst>
+  </p:cSld>
+  <p:clrMapOvr>
+    <a:masterClrMapping/>
+  </p:clrMapOvr>
+</p:sld>
+</file>
+
 <file path=ppt/slides/slide2.xml><?xml version="1.0" encoding="utf-8"?>
 <p:sld xmlns:a="http://schemas.openxmlformats.org/drawingml/2006/main" xmlns:r="http://schemas.openxmlformats.org/officeDocument/2006/relationships" xmlns:p="http://schemas.openxmlformats.org/presentationml/2006/main">
   <p:cSld>
@@ -3798,7 +3881,11 @@
           <a:p>
             <a:r>
               <a:rPr lang="en-US" dirty="0" smtClean="0"/>
-              <a:t>How the iPads are laid out</a:t>
+              <a:t>Sketch of the tables, chairs</a:t>
+            </a:r>
+            <a:r>
+              <a:rPr lang="en-US" smtClean="0"/>
+              <a:t>, iPads</a:t>
             </a:r>
             <a:endParaRPr lang="en-US" dirty="0"/>
           </a:p>
@@ -3854,35 +3941,41 @@
             <a:pPr algn="ctr"/>
             <a:r>
               <a:rPr lang="en-US" sz="4800" dirty="0" smtClean="0"/>
-              <a:t>Consumer UI</a:t>
+              <a:t>Landing Page</a:t>
             </a:r>
             <a:endParaRPr lang="en-US" sz="4800" dirty="0"/>
           </a:p>
         </p:txBody>
       </p:sp>
-      <p:sp>
-        <p:nvSpPr>
-          <p:cNvPr id="3" name="Content Placeholder 2"/>
-          <p:cNvSpPr>
-            <a:spLocks noGrp="1"/>
-          </p:cNvSpPr>
+      <p:pic>
+        <p:nvPicPr>
+          <p:cNvPr id="4" name="Content Placeholder 3"/>
+          <p:cNvPicPr>
+            <a:picLocks noGrp="1" noChangeAspect="1"/>
+          </p:cNvPicPr>
           <p:nvPr>
             <p:ph idx="1"/>
           </p:nvPr>
-        </p:nvSpPr>
-        <p:spPr/>
-        <p:txBody>
-          <a:bodyPr/>
-          <a:lstStyle/>
-          <a:p>
-            <a:r>
-              <a:rPr lang="en-US" dirty="0" smtClean="0"/>
-              <a:t>Picture of screen consumer sees</a:t>
-            </a:r>
-            <a:endParaRPr lang="en-US" dirty="0"/>
-          </a:p>
-        </p:txBody>
-      </p:sp>
+        </p:nvPicPr>
+        <p:blipFill>
+          <a:blip r:embed="rId2">
+            <a:extLst>
+              <a:ext uri="{28A0092B-C50C-407E-A947-70E740481C1C}">
+                <a14:useLocalDpi xmlns:a14="http://schemas.microsoft.com/office/drawing/2010/main" val="0"/>
+              </a:ext>
+            </a:extLst>
+          </a:blip>
+          <a:stretch>
+            <a:fillRect/>
+          </a:stretch>
+        </p:blipFill>
+        <p:spPr>
+          <a:xfrm>
+            <a:off x="3688334" y="2016125"/>
+            <a:ext cx="5129656" cy="3449638"/>
+          </a:xfrm>
+        </p:spPr>
+      </p:pic>
     </p:spTree>
     <p:extLst>
       <p:ext uri="{BB962C8B-B14F-4D97-AF65-F5344CB8AC3E}">
@@ -3933,39 +4026,45 @@
             <a:pPr algn="ctr"/>
             <a:r>
               <a:rPr lang="en-US" sz="4800" dirty="0" smtClean="0"/>
-              <a:t>Corporation UI</a:t>
+              <a:t>Consumer UI</a:t>
             </a:r>
             <a:endParaRPr lang="en-US" sz="4800" dirty="0"/>
           </a:p>
         </p:txBody>
       </p:sp>
-      <p:sp>
-        <p:nvSpPr>
-          <p:cNvPr id="3" name="Content Placeholder 2"/>
-          <p:cNvSpPr>
-            <a:spLocks noGrp="1"/>
-          </p:cNvSpPr>
+      <p:pic>
+        <p:nvPicPr>
+          <p:cNvPr id="4" name="Content Placeholder 3"/>
+          <p:cNvPicPr>
+            <a:picLocks noGrp="1" noChangeAspect="1"/>
+          </p:cNvPicPr>
           <p:nvPr>
             <p:ph idx="1"/>
           </p:nvPr>
-        </p:nvSpPr>
-        <p:spPr/>
-        <p:txBody>
-          <a:bodyPr/>
-          <a:lstStyle/>
-          <a:p>
-            <a:r>
-              <a:rPr lang="en-US" dirty="0" smtClean="0"/>
-              <a:t>Picture of screen corporation sees</a:t>
-            </a:r>
-            <a:endParaRPr lang="en-US" dirty="0"/>
-          </a:p>
-        </p:txBody>
-      </p:sp>
+        </p:nvPicPr>
+        <p:blipFill>
+          <a:blip r:embed="rId2">
+            <a:extLst>
+              <a:ext uri="{28A0092B-C50C-407E-A947-70E740481C1C}">
+                <a14:useLocalDpi xmlns:a14="http://schemas.microsoft.com/office/drawing/2010/main" val="0"/>
+              </a:ext>
+            </a:extLst>
+          </a:blip>
+          <a:stretch>
+            <a:fillRect/>
+          </a:stretch>
+        </p:blipFill>
+        <p:spPr>
+          <a:xfrm>
+            <a:off x="3688334" y="2016125"/>
+            <a:ext cx="5129656" cy="3449638"/>
+          </a:xfrm>
+        </p:spPr>
+      </p:pic>
     </p:spTree>
     <p:extLst>
       <p:ext uri="{BB962C8B-B14F-4D97-AF65-F5344CB8AC3E}">
-        <p14:creationId xmlns:p14="http://schemas.microsoft.com/office/powerpoint/2010/main" val="1267264174"/>
+        <p14:creationId xmlns:p14="http://schemas.microsoft.com/office/powerpoint/2010/main" val="947761726"/>
       </p:ext>
     </p:extLst>
   </p:cSld>
@@ -4012,39 +4111,45 @@
             <a:pPr algn="ctr"/>
             <a:r>
               <a:rPr lang="en-US" sz="4800" dirty="0" smtClean="0"/>
-              <a:t>Consumer Vs Corporation</a:t>
+              <a:t>Consumer UI</a:t>
             </a:r>
             <a:endParaRPr lang="en-US" sz="4800" dirty="0"/>
           </a:p>
         </p:txBody>
       </p:sp>
-      <p:sp>
-        <p:nvSpPr>
-          <p:cNvPr id="3" name="Content Placeholder 2"/>
-          <p:cNvSpPr>
-            <a:spLocks noGrp="1"/>
-          </p:cNvSpPr>
+      <p:pic>
+        <p:nvPicPr>
+          <p:cNvPr id="4" name="Content Placeholder 3"/>
+          <p:cNvPicPr>
+            <a:picLocks noGrp="1" noChangeAspect="1"/>
+          </p:cNvPicPr>
           <p:nvPr>
             <p:ph idx="1"/>
           </p:nvPr>
-        </p:nvSpPr>
-        <p:spPr/>
-        <p:txBody>
-          <a:bodyPr/>
-          <a:lstStyle/>
-          <a:p>
-            <a:r>
-              <a:rPr lang="en-US" dirty="0" smtClean="0"/>
-              <a:t>Description of the game play, maybe have two UI’s side by side</a:t>
-            </a:r>
-            <a:endParaRPr lang="en-US" dirty="0"/>
-          </a:p>
-        </p:txBody>
-      </p:sp>
+        </p:nvPicPr>
+        <p:blipFill>
+          <a:blip r:embed="rId2">
+            <a:extLst>
+              <a:ext uri="{28A0092B-C50C-407E-A947-70E740481C1C}">
+                <a14:useLocalDpi xmlns:a14="http://schemas.microsoft.com/office/drawing/2010/main" val="0"/>
+              </a:ext>
+            </a:extLst>
+          </a:blip>
+          <a:stretch>
+            <a:fillRect/>
+          </a:stretch>
+        </p:blipFill>
+        <p:spPr>
+          <a:xfrm>
+            <a:off x="3688334" y="2016125"/>
+            <a:ext cx="5129656" cy="3449638"/>
+          </a:xfrm>
+        </p:spPr>
+      </p:pic>
     </p:spTree>
     <p:extLst>
       <p:ext uri="{BB962C8B-B14F-4D97-AF65-F5344CB8AC3E}">
-        <p14:creationId xmlns:p14="http://schemas.microsoft.com/office/powerpoint/2010/main" val="166161472"/>
+        <p14:creationId xmlns:p14="http://schemas.microsoft.com/office/powerpoint/2010/main" val="309434787"/>
       </p:ext>
     </p:extLst>
   </p:cSld>
@@ -4091,35 +4196,295 @@
             <a:pPr algn="ctr"/>
             <a:r>
               <a:rPr lang="en-US" sz="4800" dirty="0" smtClean="0"/>
-              <a:t>Context</a:t>
+              <a:t>Corporation UI</a:t>
             </a:r>
             <a:endParaRPr lang="en-US" sz="4800" dirty="0"/>
           </a:p>
         </p:txBody>
       </p:sp>
-      <p:sp>
-        <p:nvSpPr>
-          <p:cNvPr id="3" name="Content Placeholder 2"/>
-          <p:cNvSpPr>
-            <a:spLocks noGrp="1"/>
-          </p:cNvSpPr>
+      <p:pic>
+        <p:nvPicPr>
+          <p:cNvPr id="7" name="Content Placeholder 6"/>
+          <p:cNvPicPr>
+            <a:picLocks noGrp="1" noChangeAspect="1"/>
+          </p:cNvPicPr>
           <p:nvPr>
             <p:ph idx="1"/>
           </p:nvPr>
-        </p:nvSpPr>
-        <p:spPr/>
-        <p:txBody>
-          <a:bodyPr/>
-          <a:lstStyle/>
-          <a:p>
-            <a:endParaRPr lang="en-US"/>
-          </a:p>
-        </p:txBody>
-      </p:sp>
+        </p:nvPicPr>
+        <p:blipFill>
+          <a:blip r:embed="rId2">
+            <a:extLst>
+              <a:ext uri="{28A0092B-C50C-407E-A947-70E740481C1C}">
+                <a14:useLocalDpi xmlns:a14="http://schemas.microsoft.com/office/drawing/2010/main" val="0"/>
+              </a:ext>
+            </a:extLst>
+          </a:blip>
+          <a:stretch>
+            <a:fillRect/>
+          </a:stretch>
+        </p:blipFill>
+        <p:spPr>
+          <a:xfrm>
+            <a:off x="3688334" y="2016125"/>
+            <a:ext cx="5129656" cy="3449638"/>
+          </a:xfrm>
+        </p:spPr>
+      </p:pic>
     </p:spTree>
     <p:extLst>
       <p:ext uri="{BB962C8B-B14F-4D97-AF65-F5344CB8AC3E}">
-        <p14:creationId xmlns:p14="http://schemas.microsoft.com/office/powerpoint/2010/main" val="1042415097"/>
+        <p14:creationId xmlns:p14="http://schemas.microsoft.com/office/powerpoint/2010/main" val="1267264174"/>
+      </p:ext>
+    </p:extLst>
+  </p:cSld>
+  <p:clrMapOvr>
+    <a:masterClrMapping/>
+  </p:clrMapOvr>
+</p:sld>
+</file>
+
+<file path=ppt/slides/slide8.xml><?xml version="1.0" encoding="utf-8"?>
+<p:sld xmlns:a="http://schemas.openxmlformats.org/drawingml/2006/main" xmlns:r="http://schemas.openxmlformats.org/officeDocument/2006/relationships" xmlns:p="http://schemas.openxmlformats.org/presentationml/2006/main">
+  <p:cSld>
+    <p:spTree>
+      <p:nvGrpSpPr>
+        <p:cNvPr id="1" name=""/>
+        <p:cNvGrpSpPr/>
+        <p:nvPr/>
+      </p:nvGrpSpPr>
+      <p:grpSpPr>
+        <a:xfrm>
+          <a:off x="0" y="0"/>
+          <a:ext cx="0" cy="0"/>
+          <a:chOff x="0" y="0"/>
+          <a:chExt cx="0" cy="0"/>
+        </a:xfrm>
+      </p:grpSpPr>
+      <p:sp>
+        <p:nvSpPr>
+          <p:cNvPr id="2" name="Title 1"/>
+          <p:cNvSpPr>
+            <a:spLocks noGrp="1"/>
+          </p:cNvSpPr>
+          <p:nvPr>
+            <p:ph type="title"/>
+          </p:nvPr>
+        </p:nvSpPr>
+        <p:spPr/>
+        <p:txBody>
+          <a:bodyPr>
+            <a:normAutofit/>
+          </a:bodyPr>
+          <a:lstStyle/>
+          <a:p>
+            <a:pPr algn="ctr"/>
+            <a:r>
+              <a:rPr lang="en-US" sz="4800" dirty="0" smtClean="0"/>
+              <a:t>Consumer Vs Corporation</a:t>
+            </a:r>
+            <a:endParaRPr lang="en-US" sz="4800" dirty="0"/>
+          </a:p>
+        </p:txBody>
+      </p:sp>
+      <p:pic>
+        <p:nvPicPr>
+          <p:cNvPr id="4" name="Content Placeholder 3"/>
+          <p:cNvPicPr>
+            <a:picLocks noChangeAspect="1"/>
+          </p:cNvPicPr>
+          <p:nvPr/>
+        </p:nvPicPr>
+        <p:blipFill>
+          <a:blip r:embed="rId2">
+            <a:extLst>
+              <a:ext uri="{28A0092B-C50C-407E-A947-70E740481C1C}">
+                <a14:useLocalDpi xmlns:a14="http://schemas.microsoft.com/office/drawing/2010/main" val="0"/>
+              </a:ext>
+            </a:extLst>
+          </a:blip>
+          <a:stretch>
+            <a:fillRect/>
+          </a:stretch>
+        </p:blipFill>
+        <p:spPr>
+          <a:xfrm>
+            <a:off x="1451579" y="2016125"/>
+            <a:ext cx="4769112" cy="3449638"/>
+          </a:xfrm>
+          <a:prstGeom prst="rect">
+            <a:avLst/>
+          </a:prstGeom>
+        </p:spPr>
+      </p:pic>
+      <p:sp>
+        <p:nvSpPr>
+          <p:cNvPr id="6" name="Content Placeholder 5"/>
+          <p:cNvSpPr>
+            <a:spLocks noGrp="1"/>
+          </p:cNvSpPr>
+          <p:nvPr>
+            <p:ph idx="1"/>
+          </p:nvPr>
+        </p:nvSpPr>
+        <p:spPr/>
+        <p:txBody>
+          <a:bodyPr/>
+          <a:lstStyle/>
+          <a:p>
+            <a:endParaRPr lang="en-US" dirty="0"/>
+          </a:p>
+        </p:txBody>
+      </p:sp>
+      <p:pic>
+        <p:nvPicPr>
+          <p:cNvPr id="7" name="Content Placeholder 6"/>
+          <p:cNvPicPr>
+            <a:picLocks noChangeAspect="1"/>
+          </p:cNvPicPr>
+          <p:nvPr/>
+        </p:nvPicPr>
+        <p:blipFill>
+          <a:blip r:embed="rId3">
+            <a:extLst>
+              <a:ext uri="{28A0092B-C50C-407E-A947-70E740481C1C}">
+                <a14:useLocalDpi xmlns:a14="http://schemas.microsoft.com/office/drawing/2010/main" val="0"/>
+              </a:ext>
+            </a:extLst>
+          </a:blip>
+          <a:stretch>
+            <a:fillRect/>
+          </a:stretch>
+        </p:blipFill>
+        <p:spPr>
+          <a:xfrm>
+            <a:off x="6220691" y="2015543"/>
+            <a:ext cx="4834163" cy="3449638"/>
+          </a:xfrm>
+          <a:prstGeom prst="rect">
+            <a:avLst/>
+          </a:prstGeom>
+        </p:spPr>
+      </p:pic>
+    </p:spTree>
+    <p:extLst>
+      <p:ext uri="{BB962C8B-B14F-4D97-AF65-F5344CB8AC3E}">
+        <p14:creationId xmlns:p14="http://schemas.microsoft.com/office/powerpoint/2010/main" val="166161472"/>
+      </p:ext>
+    </p:extLst>
+  </p:cSld>
+  <p:clrMapOvr>
+    <a:masterClrMapping/>
+  </p:clrMapOvr>
+</p:sld>
+</file>
+
+<file path=ppt/slides/slide9.xml><?xml version="1.0" encoding="utf-8"?>
+<p:sld xmlns:a="http://schemas.openxmlformats.org/drawingml/2006/main" xmlns:r="http://schemas.openxmlformats.org/officeDocument/2006/relationships" xmlns:p="http://schemas.openxmlformats.org/presentationml/2006/main">
+  <p:cSld>
+    <p:spTree>
+      <p:nvGrpSpPr>
+        <p:cNvPr id="1" name=""/>
+        <p:cNvGrpSpPr/>
+        <p:nvPr/>
+      </p:nvGrpSpPr>
+      <p:grpSpPr>
+        <a:xfrm>
+          <a:off x="0" y="0"/>
+          <a:ext cx="0" cy="0"/>
+          <a:chOff x="0" y="0"/>
+          <a:chExt cx="0" cy="0"/>
+        </a:xfrm>
+      </p:grpSpPr>
+      <p:sp>
+        <p:nvSpPr>
+          <p:cNvPr id="2" name="Title 1"/>
+          <p:cNvSpPr>
+            <a:spLocks noGrp="1"/>
+          </p:cNvSpPr>
+          <p:nvPr>
+            <p:ph type="title"/>
+          </p:nvPr>
+        </p:nvSpPr>
+        <p:spPr/>
+        <p:txBody>
+          <a:bodyPr>
+            <a:normAutofit/>
+          </a:bodyPr>
+          <a:lstStyle/>
+          <a:p>
+            <a:pPr algn="ctr"/>
+            <a:r>
+              <a:rPr lang="en-US" sz="4800" dirty="0" smtClean="0"/>
+              <a:t>Consumer Graph</a:t>
+            </a:r>
+            <a:endParaRPr lang="en-US" sz="4800" dirty="0"/>
+          </a:p>
+        </p:txBody>
+      </p:sp>
+      <p:pic>
+        <p:nvPicPr>
+          <p:cNvPr id="4" name="Content Placeholder 3"/>
+          <p:cNvPicPr>
+            <a:picLocks noGrp="1" noChangeAspect="1"/>
+          </p:cNvPicPr>
+          <p:nvPr>
+            <p:ph idx="1"/>
+          </p:nvPr>
+        </p:nvPicPr>
+        <p:blipFill>
+          <a:blip r:embed="rId2">
+            <a:extLst>
+              <a:ext uri="{28A0092B-C50C-407E-A947-70E740481C1C}">
+                <a14:useLocalDpi xmlns:a14="http://schemas.microsoft.com/office/drawing/2010/main" val="0"/>
+              </a:ext>
+            </a:extLst>
+          </a:blip>
+          <a:stretch>
+            <a:fillRect/>
+          </a:stretch>
+        </p:blipFill>
+        <p:spPr>
+          <a:xfrm>
+            <a:off x="1720221" y="2016125"/>
+            <a:ext cx="4532995" cy="3449638"/>
+          </a:xfrm>
+        </p:spPr>
+      </p:pic>
+      <p:pic>
+        <p:nvPicPr>
+          <p:cNvPr id="5" name="Picture 4"/>
+          <p:cNvPicPr>
+            <a:picLocks noChangeAspect="1"/>
+          </p:cNvPicPr>
+          <p:nvPr/>
+        </p:nvPicPr>
+        <p:blipFill>
+          <a:blip r:embed="rId3">
+            <a:extLst>
+              <a:ext uri="{28A0092B-C50C-407E-A947-70E740481C1C}">
+                <a14:useLocalDpi xmlns:a14="http://schemas.microsoft.com/office/drawing/2010/main" val="0"/>
+              </a:ext>
+            </a:extLst>
+          </a:blip>
+          <a:stretch>
+            <a:fillRect/>
+          </a:stretch>
+        </p:blipFill>
+        <p:spPr>
+          <a:xfrm>
+            <a:off x="6782020" y="2016125"/>
+            <a:ext cx="2915006" cy="4070957"/>
+          </a:xfrm>
+          <a:prstGeom prst="rect">
+            <a:avLst/>
+          </a:prstGeom>
+        </p:spPr>
+      </p:pic>
+    </p:spTree>
+    <p:extLst>
+      <p:ext uri="{BB962C8B-B14F-4D97-AF65-F5344CB8AC3E}">
+        <p14:creationId xmlns:p14="http://schemas.microsoft.com/office/powerpoint/2010/main" val="716092638"/>
       </p:ext>
     </p:extLst>
   </p:cSld>

</xml_diff>